<commit_message>
Exercise 4 and 5 done and commented on the pptx
</commit_message>
<xml_diff>
--- a/LabBook_10.pptx
+++ b/LabBook_10.pptx
@@ -350,7 +350,7 @@
             <a:pPr indent="0" algn="r">
               <a:buNone/>
             </a:pPr>
-            <a:fld id="{6B6AE25F-9839-4FFC-A87C-52816ECF211D}" type="slidenum">
+            <a:fld id="{D030ECEB-B496-48BB-9F38-36D3776D1265}" type="slidenum">
               <a:rPr b="0" lang="es-ES" sz="1400" spc="-1" strike="noStrike">
                 <a:solidFill>
                   <a:srgbClr val="000000"/>
@@ -393,7 +393,7 @@
       </p:grpSpPr>
       <p:sp>
         <p:nvSpPr>
-          <p:cNvPr id="116" name="PlaceHolder 1"/>
+          <p:cNvPr id="120" name="PlaceHolder 1"/>
           <p:cNvSpPr>
             <a:spLocks noGrp="1"/>
           </p:cNvSpPr>
@@ -416,7 +416,7 @@
       </p:sp>
       <p:sp>
         <p:nvSpPr>
-          <p:cNvPr id="117" name="PlaceHolder 2"/>
+          <p:cNvPr id="121" name="PlaceHolder 2"/>
           <p:cNvSpPr>
             <a:spLocks noGrp="1"/>
           </p:cNvSpPr>
@@ -456,7 +456,7 @@
       </p:sp>
       <p:sp>
         <p:nvSpPr>
-          <p:cNvPr id="118" name="PlaceHolder 3"/>
+          <p:cNvPr id="122" name="PlaceHolder 3"/>
           <p:cNvSpPr>
             <a:spLocks noGrp="1"/>
           </p:cNvSpPr>
@@ -508,14 +508,14 @@
                 <a:tab algn="l" pos="0"/>
               </a:tabLst>
             </a:pPr>
-            <a:fld id="{FED367B8-2DD4-425C-A9DD-DE4B7FAB8AAE}" type="slidenum">
+            <a:fld id="{D71C87D2-4195-4B1B-8138-4D1AD5C38EE7}" type="slidenum">
               <a:rPr b="0" lang="es-ES" sz="1200" spc="-1" strike="noStrike">
                 <a:solidFill>
                   <a:srgbClr val="000000"/>
                 </a:solidFill>
                 <a:latin typeface="Times New Roman"/>
               </a:rPr>
-              <a:t>&lt;número&gt;</a:t>
+              <a:t>3</a:t>
             </a:fld>
             <a:endParaRPr b="0" lang="es-ES" sz="1200" spc="-1" strike="noStrike">
               <a:solidFill>
@@ -550,7 +550,7 @@
       </p:grpSpPr>
       <p:sp>
         <p:nvSpPr>
-          <p:cNvPr id="119" name="PlaceHolder 1"/>
+          <p:cNvPr id="123" name="PlaceHolder 1"/>
           <p:cNvSpPr>
             <a:spLocks noGrp="1"/>
           </p:cNvSpPr>
@@ -573,7 +573,7 @@
       </p:sp>
       <p:sp>
         <p:nvSpPr>
-          <p:cNvPr id="120" name="PlaceHolder 2"/>
+          <p:cNvPr id="124" name="PlaceHolder 2"/>
           <p:cNvSpPr>
             <a:spLocks noGrp="1"/>
           </p:cNvSpPr>
@@ -613,7 +613,7 @@
       </p:sp>
       <p:sp>
         <p:nvSpPr>
-          <p:cNvPr id="121" name="PlaceHolder 3"/>
+          <p:cNvPr id="125" name="PlaceHolder 3"/>
           <p:cNvSpPr>
             <a:spLocks noGrp="1"/>
           </p:cNvSpPr>
@@ -665,14 +665,14 @@
                 <a:tab algn="l" pos="0"/>
               </a:tabLst>
             </a:pPr>
-            <a:fld id="{30350546-6460-4D5F-BA76-709B5560CB26}" type="slidenum">
+            <a:fld id="{51421D93-0AA9-4160-BDFD-3D0CAC4AE65F}" type="slidenum">
               <a:rPr b="0" lang="es-ES" sz="1200" spc="-1" strike="noStrike">
                 <a:solidFill>
                   <a:srgbClr val="000000"/>
                 </a:solidFill>
                 <a:latin typeface="Times New Roman"/>
               </a:rPr>
-              <a:t>&lt;número&gt;</a:t>
+              <a:t>3</a:t>
             </a:fld>
             <a:endParaRPr b="0" lang="es-ES" sz="1200" spc="-1" strike="noStrike">
               <a:solidFill>
@@ -707,7 +707,7 @@
       </p:grpSpPr>
       <p:sp>
         <p:nvSpPr>
-          <p:cNvPr id="122" name="PlaceHolder 1"/>
+          <p:cNvPr id="126" name="PlaceHolder 1"/>
           <p:cNvSpPr>
             <a:spLocks noGrp="1"/>
           </p:cNvSpPr>
@@ -730,7 +730,7 @@
       </p:sp>
       <p:sp>
         <p:nvSpPr>
-          <p:cNvPr id="123" name="PlaceHolder 2"/>
+          <p:cNvPr id="127" name="PlaceHolder 2"/>
           <p:cNvSpPr>
             <a:spLocks noGrp="1"/>
           </p:cNvSpPr>
@@ -770,7 +770,7 @@
       </p:sp>
       <p:sp>
         <p:nvSpPr>
-          <p:cNvPr id="124" name="PlaceHolder 3"/>
+          <p:cNvPr id="128" name="PlaceHolder 3"/>
           <p:cNvSpPr>
             <a:spLocks noGrp="1"/>
           </p:cNvSpPr>
@@ -822,7 +822,7 @@
                 <a:tab algn="l" pos="0"/>
               </a:tabLst>
             </a:pPr>
-            <a:fld id="{496D7D40-BE50-4E0A-AB27-E6E2E36A3696}" type="slidenum">
+            <a:fld id="{34E68CE7-9CB8-4F22-B1ED-6936573862D9}" type="slidenum">
               <a:rPr b="0" lang="es-ES" sz="1200" spc="-1" strike="noStrike">
                 <a:solidFill>
                   <a:srgbClr val="000000"/>
@@ -864,7 +864,7 @@
       </p:grpSpPr>
       <p:sp>
         <p:nvSpPr>
-          <p:cNvPr id="125" name="PlaceHolder 1"/>
+          <p:cNvPr id="129" name="PlaceHolder 1"/>
           <p:cNvSpPr>
             <a:spLocks noGrp="1"/>
           </p:cNvSpPr>
@@ -887,7 +887,7 @@
       </p:sp>
       <p:sp>
         <p:nvSpPr>
-          <p:cNvPr id="126" name="PlaceHolder 2"/>
+          <p:cNvPr id="130" name="PlaceHolder 2"/>
           <p:cNvSpPr>
             <a:spLocks noGrp="1"/>
           </p:cNvSpPr>
@@ -927,7 +927,7 @@
       </p:sp>
       <p:sp>
         <p:nvSpPr>
-          <p:cNvPr id="127" name="PlaceHolder 3"/>
+          <p:cNvPr id="131" name="PlaceHolder 3"/>
           <p:cNvSpPr>
             <a:spLocks noGrp="1"/>
           </p:cNvSpPr>
@@ -979,7 +979,7 @@
                 <a:tab algn="l" pos="0"/>
               </a:tabLst>
             </a:pPr>
-            <a:fld id="{E25470B8-15F6-4D6E-B38A-D90B85CDCD57}" type="slidenum">
+            <a:fld id="{C5B9460E-5113-445C-BA9D-C821D3E3FBEF}" type="slidenum">
               <a:rPr b="0" lang="es-ES" sz="1200" spc="-1" strike="noStrike">
                 <a:solidFill>
                   <a:srgbClr val="000000"/>
@@ -1021,7 +1021,7 @@
       </p:grpSpPr>
       <p:sp>
         <p:nvSpPr>
-          <p:cNvPr id="128" name="PlaceHolder 1"/>
+          <p:cNvPr id="132" name="PlaceHolder 1"/>
           <p:cNvSpPr>
             <a:spLocks noGrp="1"/>
           </p:cNvSpPr>
@@ -1044,7 +1044,7 @@
       </p:sp>
       <p:sp>
         <p:nvSpPr>
-          <p:cNvPr id="129" name="PlaceHolder 2"/>
+          <p:cNvPr id="133" name="PlaceHolder 2"/>
           <p:cNvSpPr>
             <a:spLocks noGrp="1"/>
           </p:cNvSpPr>
@@ -1084,7 +1084,7 @@
       </p:sp>
       <p:sp>
         <p:nvSpPr>
-          <p:cNvPr id="130" name="PlaceHolder 3"/>
+          <p:cNvPr id="134" name="PlaceHolder 3"/>
           <p:cNvSpPr>
             <a:spLocks noGrp="1"/>
           </p:cNvSpPr>
@@ -1136,7 +1136,7 @@
                 <a:tab algn="l" pos="0"/>
               </a:tabLst>
             </a:pPr>
-            <a:fld id="{292E6982-5F8D-4C59-814C-567F43B9463D}" type="slidenum">
+            <a:fld id="{191AF286-07D0-4892-8334-72A3319E4A3A}" type="slidenum">
               <a:rPr b="0" lang="es-ES" sz="1200" spc="-1" strike="noStrike">
                 <a:solidFill>
                   <a:srgbClr val="000000"/>
@@ -1293,7 +1293,7 @@
         <p:txBody>
           <a:bodyPr/>
           <a:p>
-            <a:fld id="{B32FAB62-F698-47BF-BEBB-6BC78E8C08FC}" type="slidenum">
+            <a:fld id="{C4F3DAB3-435F-4C7A-B683-F797D29D5816}" type="slidenum">
               <a:t>&lt;#&gt;</a:t>
             </a:fld>
           </a:p>
@@ -1459,7 +1459,7 @@
         <p:txBody>
           <a:bodyPr/>
           <a:p>
-            <a:fld id="{DCD041FF-10E2-4714-BE27-1A818F5B4EE6}" type="slidenum">
+            <a:fld id="{DD57771B-27F8-410D-935A-8AAAD99E4D55}" type="slidenum">
               <a:t>&lt;#&gt;</a:t>
             </a:fld>
           </a:p>
@@ -1604,7 +1604,7 @@
         <p:txBody>
           <a:bodyPr/>
           <a:p>
-            <a:fld id="{9BDDAB36-7293-4597-A76F-E9D26625E28B}" type="slidenum">
+            <a:fld id="{B81C971C-85C4-475E-954B-C697CBD431CF}" type="slidenum">
               <a:t>&lt;#&gt;</a:t>
             </a:fld>
           </a:p>
@@ -1750,7 +1750,7 @@
         <p:txBody>
           <a:bodyPr/>
           <a:p>
-            <a:fld id="{25B88302-F4C9-49AF-8698-B9FD40353464}" type="slidenum">
+            <a:fld id="{932128F1-ED6A-4906-81BA-7AD7DB8ADBD6}" type="slidenum">
               <a:t>&lt;#&gt;</a:t>
             </a:fld>
           </a:p>
@@ -1896,7 +1896,7 @@
         <p:txBody>
           <a:bodyPr/>
           <a:p>
-            <a:fld id="{52367491-B133-4CEC-8CB7-5F28BEFD1A99}" type="slidenum">
+            <a:fld id="{3D786BAB-E418-42E5-AF80-4DE01AA4E3C0}" type="slidenum">
               <a:t>&lt;#&gt;</a:t>
             </a:fld>
           </a:p>
@@ -2038,16 +2038,7 @@
                 </a:solidFill>
                 <a:latin typeface="Arial"/>
               </a:rPr>
-              <a:t>Pulse para editar el </a:t>
-            </a:r>
-            <a:r>
-              <a:rPr b="0" lang="es-ES" sz="1800" spc="-1" strike="noStrike">
-                <a:solidFill>
-                  <a:srgbClr val="000000"/>
-                </a:solidFill>
-                <a:latin typeface="Arial"/>
-              </a:rPr>
-              <a:t>formato del texto de título</a:t>
+              <a:t>Pulse para editar el formato del texto de título</a:t>
             </a:r>
             <a:endParaRPr b="0" lang="es-ES" sz="1800" spc="-1" strike="noStrike">
               <a:solidFill>
@@ -2417,7 +2408,7 @@
                 <a:tab algn="l" pos="0"/>
               </a:tabLst>
             </a:pPr>
-            <a:fld id="{C665D7D9-B691-4F9A-BE3D-38D8AF8C02A5}" type="slidenum">
+            <a:fld id="{16F531A3-E61C-4033-BA8F-6C3E50ADD6D0}" type="slidenum">
               <a:rPr b="0" lang="es-ES" sz="1800" spc="-1" strike="noStrike">
                 <a:solidFill>
                   <a:schemeClr val="dk1">
@@ -2616,25 +2607,7 @@
                 </a:solidFill>
                 <a:latin typeface="Arial"/>
               </a:rPr>
-              <a:t>Pulse para editar </a:t>
-            </a:r>
-            <a:r>
-              <a:rPr b="0" lang="es-ES" sz="1800" spc="-1" strike="noStrike">
-                <a:solidFill>
-                  <a:srgbClr val="000000"/>
-                </a:solidFill>
-                <a:latin typeface="Arial"/>
-              </a:rPr>
-              <a:t>el formato del </a:t>
-            </a:r>
-            <a:r>
-              <a:rPr b="0" lang="es-ES" sz="1800" spc="-1" strike="noStrike">
-                <a:solidFill>
-                  <a:srgbClr val="000000"/>
-                </a:solidFill>
-                <a:latin typeface="Arial"/>
-              </a:rPr>
-              <a:t>texto de título</a:t>
+              <a:t>Pulse para editar el formato del texto de título</a:t>
             </a:r>
             <a:endParaRPr b="0" lang="es-ES" sz="1800" spc="-1" strike="noStrike">
               <a:solidFill>
@@ -3004,7 +2977,7 @@
                 <a:tab algn="l" pos="0"/>
               </a:tabLst>
             </a:pPr>
-            <a:fld id="{778A96A7-44EF-41A3-A845-049338CA2469}" type="slidenum">
+            <a:fld id="{639FBE60-8EFC-43B9-B943-88372EF5121D}" type="slidenum">
               <a:rPr b="0" lang="es-ES" sz="1800" spc="-1" strike="noStrike">
                 <a:solidFill>
                   <a:schemeClr val="dk1">
@@ -3143,16 +3116,7 @@
                 </a:solidFill>
                 <a:latin typeface="Arial"/>
               </a:rPr>
-              <a:t>Pulse para editar el </a:t>
-            </a:r>
-            <a:r>
-              <a:rPr b="0" lang="es-ES" sz="1800" spc="-1" strike="noStrike">
-                <a:solidFill>
-                  <a:srgbClr val="000000"/>
-                </a:solidFill>
-                <a:latin typeface="Arial"/>
-              </a:rPr>
-              <a:t>formato del texto de título</a:t>
+              <a:t>Pulse para editar el formato del texto de título</a:t>
             </a:r>
             <a:endParaRPr b="0" lang="es-ES" sz="1800" spc="-1" strike="noStrike">
               <a:solidFill>
@@ -3522,7 +3486,7 @@
                 <a:tab algn="l" pos="0"/>
               </a:tabLst>
             </a:pPr>
-            <a:fld id="{98B778DC-4260-4C3C-A3DA-1FDE1C88F422}" type="slidenum">
+            <a:fld id="{3FD41DBE-63A9-42E2-8DF4-2BCF9AFDDE5A}" type="slidenum">
               <a:rPr b="0" lang="es-ES" sz="1800" spc="-1" strike="noStrike">
                 <a:solidFill>
                   <a:schemeClr val="dk1">
@@ -4164,7 +4128,7 @@
                 <a:tab algn="l" pos="0"/>
               </a:tabLst>
             </a:pPr>
-            <a:fld id="{1F1B66D8-FBB5-43B4-BFEA-44833DF8E168}" type="slidenum">
+            <a:fld id="{CB089B59-2B36-4545-99F3-4D5F07E8477C}" type="slidenum">
               <a:rPr b="0" lang="es-ES" sz="1800" spc="-1" strike="noStrike">
                 <a:solidFill>
                   <a:schemeClr val="dk1">
@@ -4732,7 +4696,7 @@
                 <a:tab algn="l" pos="0"/>
               </a:tabLst>
             </a:pPr>
-            <a:fld id="{5BE2EF34-F15F-4908-AE5F-8A8B2784C77B}" type="slidenum">
+            <a:fld id="{C9245957-C92C-4726-86C3-F2502FCC96CF}" type="slidenum">
               <a:rPr b="0" lang="es-ES" sz="1800" spc="-1" strike="noStrike">
                 <a:solidFill>
                   <a:schemeClr val="dk1">
@@ -5012,7 +4976,7 @@
         <p:txBody>
           <a:bodyPr/>
           <a:p>
-            <a:fld id="{2E9786B4-0C5B-4CEC-BC73-B47834EE23B3}" type="slidenum">
+            <a:fld id="{F8173A27-F86F-4059-BDE4-413F6202ACBD}" type="slidenum">
               <a:t>1</a:t>
             </a:fld>
           </a:p>
@@ -7248,7 +7212,7 @@
         <p:txBody>
           <a:bodyPr/>
           <a:p>
-            <a:fld id="{48477C36-DD81-40D4-B7B8-8A3A99A8ED05}" type="slidenum">
+            <a:fld id="{29146026-87F1-4609-8E5D-B1D60AF53B35}" type="slidenum">
               <a:t>2</a:t>
             </a:fld>
           </a:p>
@@ -7933,7 +7897,7 @@
         <p:txBody>
           <a:bodyPr/>
           <a:p>
-            <a:fld id="{521DBD8A-B841-49BA-8F78-F5667B703C40}" type="slidenum">
+            <a:fld id="{813AFB85-3C1B-4778-86E2-EE37E169564A}" type="slidenum">
               <a:t>3</a:t>
             </a:fld>
           </a:p>
@@ -8651,7 +8615,7 @@
         <p:txBody>
           <a:bodyPr/>
           <a:p>
-            <a:fld id="{7811FFBC-9492-433D-A793-30BF4FCDB6DE}" type="slidenum">
+            <a:fld id="{50223924-996F-40F8-B220-B24947ED6A1F}" type="slidenum">
               <a:t>4</a:t>
             </a:fld>
           </a:p>
@@ -8873,7 +8837,7 @@
         <p:spPr>
           <a:xfrm>
             <a:off x="609480" y="4860360"/>
-            <a:ext cx="11199240" cy="1098360"/>
+            <a:ext cx="11199240" cy="1250280"/>
           </a:xfrm>
           <a:prstGeom prst="rect">
             <a:avLst/>
@@ -8923,7 +8887,7 @@
             </a:endParaRPr>
           </a:p>
           <a:p>
-            <a:pPr algn="just" defTabSz="914400">
+            <a:pPr marL="216000" indent="-216000" algn="just" defTabSz="914400">
               <a:lnSpc>
                 <a:spcPct val="100000"/>
               </a:lnSpc>
@@ -8933,6 +8897,12 @@
               <a:spcAft>
                 <a:spcPts val="992"/>
               </a:spcAft>
+              <a:buClr>
+                <a:srgbClr val="000000"/>
+              </a:buClr>
+              <a:buSzPct val="45000"/>
+              <a:buFont typeface="Wingdings" charset="2"/>
+              <a:buChar char=""/>
             </a:pPr>
             <a:r>
               <a:rPr b="0" lang="en-US" sz="1200" spc="-1" strike="noStrike">
@@ -8941,7 +8911,7 @@
                 </a:solidFill>
                 <a:latin typeface="Arial"/>
               </a:rPr>
-              <a:t>As the waveguide width increases, the effective index of each mode rises smoothly, indicating stronger confinement in the high‑index core, and the TE fraction shows how each mode gradually becomes more (or less) TE‑polarized across the width range.</a:t>
+              <a:t>As the waveguide width increases, the effective index of each mode rises smoothly, indicating stronger confinement in the high‑index core.</a:t>
             </a:r>
             <a:endParaRPr b="0" lang="es-ES" sz="1200" spc="-1" strike="noStrike">
               <a:solidFill>
@@ -8951,11 +8921,32 @@
             </a:endParaRPr>
           </a:p>
           <a:p>
-            <a:pPr algn="just" defTabSz="914400">
-              <a:lnSpc>
-                <a:spcPct val="100000"/>
-              </a:lnSpc>
-            </a:pPr>
+            <a:pPr marL="216000" indent="-216000" algn="just" defTabSz="914400">
+              <a:lnSpc>
+                <a:spcPct val="100000"/>
+              </a:lnSpc>
+              <a:spcBef>
+                <a:spcPts val="1191"/>
+              </a:spcBef>
+              <a:spcAft>
+                <a:spcPts val="992"/>
+              </a:spcAft>
+              <a:buClr>
+                <a:srgbClr val="000000"/>
+              </a:buClr>
+              <a:buSzPct val="45000"/>
+              <a:buFont typeface="Wingdings" charset="2"/>
+              <a:buChar char=""/>
+            </a:pPr>
+            <a:r>
+              <a:rPr b="0" lang="en-US" sz="1200" spc="-1" strike="noStrike">
+                <a:solidFill>
+                  <a:schemeClr val="dk1"/>
+                </a:solidFill>
+                <a:latin typeface="Arial"/>
+              </a:rPr>
+              <a:t>Polarization:We have pure TE0 and pure TM1, but modes 2 and 3 have not a polarized mode when they are unguided, but become more TE and TM polarized across the width range, which means a dependence between waveguude confine</a:t>
+            </a:r>
             <a:endParaRPr b="0" lang="es-ES" sz="1200" spc="-1" strike="noStrike">
               <a:solidFill>
                 <a:srgbClr val="000000"/>
@@ -9154,7 +9145,7 @@
         <p:txBody>
           <a:bodyPr/>
           <a:p>
-            <a:fld id="{F56D5EF9-46D0-44D7-A590-8B6C46426D58}" type="slidenum">
+            <a:fld id="{07CE9D87-EC09-4277-B41F-179B11E1D39E}" type="slidenum">
               <a:t>5</a:t>
             </a:fld>
           </a:p>
@@ -9740,704 +9731,9 @@
           </a:p>
         </p:txBody>
       </p:sp>
-      <p:graphicFrame>
-        <p:nvGraphicFramePr>
+      <p:sp>
+        <p:nvSpPr>
           <p:cNvPr id="106" name=""/>
-          <p:cNvGraphicFramePr/>
-          <p:nvPr/>
-        </p:nvGraphicFramePr>
-        <p:xfrm>
-          <a:off x="1008360" y="2730240"/>
-          <a:ext cx="5075280" cy="1464480"/>
-        </p:xfrm>
-        <a:graphic>
-          <a:graphicData uri="http://schemas.openxmlformats.org/drawingml/2006/table">
-            <a:tbl>
-              <a:tblPr/>
-              <a:tblGrid>
-                <a:gridCol w="1691640"/>
-                <a:gridCol w="1691640"/>
-                <a:gridCol w="1692360"/>
-              </a:tblGrid>
-              <a:tr h="364680">
-                <a:tc>
-                  <a:txBody>
-                    <a:bodyPr lIns="36000" rIns="36000" anchor="t">
-                      <a:noAutofit/>
-                    </a:bodyPr>
-                    <a:p>
-                      <a:pPr>
-                        <a:lnSpc>
-                          <a:spcPct val="100000"/>
-                        </a:lnSpc>
-                      </a:pPr>
-                      <a:r>
-                        <a:rPr b="0" lang="es-ES" sz="1800" spc="-1" strike="noStrike">
-                          <a:solidFill>
-                            <a:srgbClr val="000000"/>
-                          </a:solidFill>
-                          <a:latin typeface="Arial"/>
-                        </a:rPr>
-                        <a:t>Parameter</a:t>
-                      </a:r>
-                      <a:endParaRPr b="0" lang="es-ES" sz="1800" spc="-1" strike="noStrike">
-                        <a:solidFill>
-                          <a:srgbClr val="000000"/>
-                        </a:solidFill>
-                        <a:latin typeface="Arial"/>
-                      </a:endParaRPr>
-                    </a:p>
-                  </a:txBody>
-                  <a:tcPr anchor="t" marL="36000" marR="36000">
-                    <a:lnL w="7200">
-                      <a:solidFill>
-                        <a:srgbClr val="000000"/>
-                      </a:solidFill>
-                      <a:prstDash val="solid"/>
-                    </a:lnL>
-                    <a:lnR w="7200">
-                      <a:solidFill>
-                        <a:srgbClr val="000000"/>
-                      </a:solidFill>
-                      <a:prstDash val="solid"/>
-                    </a:lnR>
-                    <a:lnT w="7200">
-                      <a:solidFill>
-                        <a:srgbClr val="000000"/>
-                      </a:solidFill>
-                      <a:prstDash val="solid"/>
-                    </a:lnT>
-                    <a:lnB w="7200">
-                      <a:solidFill>
-                        <a:srgbClr val="000000"/>
-                      </a:solidFill>
-                      <a:prstDash val="solid"/>
-                    </a:lnB>
-                    <a:noFill/>
-                  </a:tcPr>
-                </a:tc>
-                <a:tc>
-                  <a:txBody>
-                    <a:bodyPr lIns="36000" rIns="36000" anchor="t">
-                      <a:noAutofit/>
-                    </a:bodyPr>
-                    <a:p>
-                      <a:pPr>
-                        <a:lnSpc>
-                          <a:spcPct val="100000"/>
-                        </a:lnSpc>
-                      </a:pPr>
-                      <a:r>
-                        <a:rPr b="0" lang="es-ES" sz="1800" spc="-1" strike="noStrike">
-                          <a:solidFill>
-                            <a:srgbClr val="000000"/>
-                          </a:solidFill>
-                          <a:latin typeface="Arial"/>
-                        </a:rPr>
-                        <a:t>Deep </a:t>
-                      </a:r>
-                      <a:endParaRPr b="0" lang="es-ES" sz="1800" spc="-1" strike="noStrike">
-                        <a:solidFill>
-                          <a:srgbClr val="000000"/>
-                        </a:solidFill>
-                        <a:latin typeface="Arial"/>
-                      </a:endParaRPr>
-                    </a:p>
-                  </a:txBody>
-                  <a:tcPr anchor="t" marL="36000" marR="36000">
-                    <a:lnL w="7200">
-                      <a:solidFill>
-                        <a:srgbClr val="000000"/>
-                      </a:solidFill>
-                      <a:prstDash val="solid"/>
-                    </a:lnL>
-                    <a:lnR w="7200">
-                      <a:solidFill>
-                        <a:srgbClr val="000000"/>
-                      </a:solidFill>
-                      <a:prstDash val="solid"/>
-                    </a:lnR>
-                    <a:lnT w="7200">
-                      <a:solidFill>
-                        <a:srgbClr val="000000"/>
-                      </a:solidFill>
-                      <a:prstDash val="solid"/>
-                    </a:lnT>
-                    <a:lnB w="7200">
-                      <a:solidFill>
-                        <a:srgbClr val="000000"/>
-                      </a:solidFill>
-                      <a:prstDash val="solid"/>
-                    </a:lnB>
-                    <a:noFill/>
-                  </a:tcPr>
-                </a:tc>
-                <a:tc>
-                  <a:txBody>
-                    <a:bodyPr lIns="36000" rIns="36000" anchor="t">
-                      <a:noAutofit/>
-                    </a:bodyPr>
-                    <a:p>
-                      <a:pPr>
-                        <a:lnSpc>
-                          <a:spcPct val="100000"/>
-                        </a:lnSpc>
-                      </a:pPr>
-                      <a:r>
-                        <a:rPr b="0" lang="es-ES" sz="1800" spc="-1" strike="noStrike">
-                          <a:solidFill>
-                            <a:srgbClr val="000000"/>
-                          </a:solidFill>
-                          <a:latin typeface="Arial"/>
-                        </a:rPr>
-                        <a:t>Shallow</a:t>
-                      </a:r>
-                      <a:endParaRPr b="0" lang="es-ES" sz="1800" spc="-1" strike="noStrike">
-                        <a:solidFill>
-                          <a:srgbClr val="000000"/>
-                        </a:solidFill>
-                        <a:latin typeface="Arial"/>
-                      </a:endParaRPr>
-                    </a:p>
-                  </a:txBody>
-                  <a:tcPr anchor="t" marL="36000" marR="36000">
-                    <a:lnL w="7200">
-                      <a:solidFill>
-                        <a:srgbClr val="000000"/>
-                      </a:solidFill>
-                      <a:prstDash val="solid"/>
-                    </a:lnL>
-                    <a:lnR w="7200">
-                      <a:solidFill>
-                        <a:srgbClr val="000000"/>
-                      </a:solidFill>
-                      <a:prstDash val="solid"/>
-                    </a:lnR>
-                    <a:lnT w="7200">
-                      <a:solidFill>
-                        <a:srgbClr val="000000"/>
-                      </a:solidFill>
-                      <a:prstDash val="solid"/>
-                    </a:lnT>
-                    <a:lnB w="7200">
-                      <a:solidFill>
-                        <a:srgbClr val="000000"/>
-                      </a:solidFill>
-                      <a:prstDash val="solid"/>
-                    </a:lnB>
-                    <a:noFill/>
-                  </a:tcPr>
-                </a:tc>
-              </a:tr>
-              <a:tr h="364680">
-                <a:tc>
-                  <a:txBody>
-                    <a:bodyPr lIns="36000" rIns="36000" anchor="t">
-                      <a:noAutofit/>
-                    </a:bodyPr>
-                    <a:p>
-                      <a:pPr>
-                        <a:lnSpc>
-                          <a:spcPct val="100000"/>
-                        </a:lnSpc>
-                      </a:pPr>
-                      <a:r>
-                        <a:rPr b="0" lang="es-ES" sz="1800" spc="-1" strike="noStrike">
-                          <a:solidFill>
-                            <a:srgbClr val="000000"/>
-                          </a:solidFill>
-                          <a:latin typeface="Arial"/>
-                        </a:rPr>
-                        <a:t>n(λ0)</a:t>
-                      </a:r>
-                      <a:endParaRPr b="0" lang="es-ES" sz="1800" spc="-1" strike="noStrike">
-                        <a:solidFill>
-                          <a:srgbClr val="000000"/>
-                        </a:solidFill>
-                        <a:latin typeface="Arial"/>
-                      </a:endParaRPr>
-                    </a:p>
-                  </a:txBody>
-                  <a:tcPr anchor="t" marL="36000" marR="36000">
-                    <a:lnL w="7200">
-                      <a:solidFill>
-                        <a:srgbClr val="000000"/>
-                      </a:solidFill>
-                      <a:prstDash val="solid"/>
-                    </a:lnL>
-                    <a:lnR w="7200">
-                      <a:solidFill>
-                        <a:srgbClr val="000000"/>
-                      </a:solidFill>
-                      <a:prstDash val="solid"/>
-                    </a:lnR>
-                    <a:lnT w="7200">
-                      <a:solidFill>
-                        <a:srgbClr val="000000"/>
-                      </a:solidFill>
-                      <a:prstDash val="solid"/>
-                    </a:lnT>
-                    <a:lnB w="7200">
-                      <a:solidFill>
-                        <a:srgbClr val="000000"/>
-                      </a:solidFill>
-                      <a:prstDash val="solid"/>
-                    </a:lnB>
-                    <a:noFill/>
-                  </a:tcPr>
-                </a:tc>
-                <a:tc>
-                  <a:txBody>
-                    <a:bodyPr lIns="36000" rIns="36000" anchor="t">
-                      <a:noAutofit/>
-                    </a:bodyPr>
-                    <a:p>
-                      <a:pPr>
-                        <a:lnSpc>
-                          <a:spcPct val="100000"/>
-                        </a:lnSpc>
-                      </a:pPr>
-                      <a:endParaRPr b="0" lang="es-ES" sz="1800" spc="-1" strike="noStrike">
-                        <a:solidFill>
-                          <a:srgbClr val="000000"/>
-                        </a:solidFill>
-                        <a:latin typeface="Arial"/>
-                      </a:endParaRPr>
-                    </a:p>
-                  </a:txBody>
-                  <a:tcPr anchor="t" marL="36000" marR="36000">
-                    <a:lnL w="7200">
-                      <a:solidFill>
-                        <a:srgbClr val="000000"/>
-                      </a:solidFill>
-                      <a:prstDash val="solid"/>
-                    </a:lnL>
-                    <a:lnR w="7200">
-                      <a:solidFill>
-                        <a:srgbClr val="000000"/>
-                      </a:solidFill>
-                      <a:prstDash val="solid"/>
-                    </a:lnR>
-                    <a:lnT w="7200">
-                      <a:solidFill>
-                        <a:srgbClr val="000000"/>
-                      </a:solidFill>
-                      <a:prstDash val="solid"/>
-                    </a:lnT>
-                    <a:lnB w="7200">
-                      <a:solidFill>
-                        <a:srgbClr val="000000"/>
-                      </a:solidFill>
-                      <a:prstDash val="solid"/>
-                    </a:lnB>
-                    <a:noFill/>
-                  </a:tcPr>
-                </a:tc>
-                <a:tc>
-                  <a:txBody>
-                    <a:bodyPr lIns="36000" rIns="36000" anchor="t">
-                      <a:noAutofit/>
-                    </a:bodyPr>
-                    <a:p>
-                      <a:pPr>
-                        <a:lnSpc>
-                          <a:spcPct val="100000"/>
-                        </a:lnSpc>
-                      </a:pPr>
-                      <a:r>
-                        <a:rPr b="0" lang="es-ES" sz="1800" spc="-1" strike="noStrike">
-                          <a:solidFill>
-                            <a:srgbClr val="000000"/>
-                          </a:solidFill>
-                          <a:latin typeface="Arial"/>
-                        </a:rPr>
-                        <a:t>1.624091</a:t>
-                      </a:r>
-                      <a:endParaRPr b="0" lang="es-ES" sz="1800" spc="-1" strike="noStrike">
-                        <a:solidFill>
-                          <a:srgbClr val="000000"/>
-                        </a:solidFill>
-                        <a:latin typeface="Arial"/>
-                      </a:endParaRPr>
-                    </a:p>
-                  </a:txBody>
-                  <a:tcPr anchor="t" marL="36000" marR="36000">
-                    <a:lnL w="7200">
-                      <a:solidFill>
-                        <a:srgbClr val="000000"/>
-                      </a:solidFill>
-                      <a:prstDash val="solid"/>
-                    </a:lnL>
-                    <a:lnR w="7200">
-                      <a:solidFill>
-                        <a:srgbClr val="000000"/>
-                      </a:solidFill>
-                      <a:prstDash val="solid"/>
-                    </a:lnR>
-                    <a:lnT w="7200">
-                      <a:solidFill>
-                        <a:srgbClr val="000000"/>
-                      </a:solidFill>
-                      <a:prstDash val="solid"/>
-                    </a:lnT>
-                    <a:lnB w="7200">
-                      <a:solidFill>
-                        <a:srgbClr val="000000"/>
-                      </a:solidFill>
-                      <a:prstDash val="solid"/>
-                    </a:lnB>
-                    <a:noFill/>
-                  </a:tcPr>
-                </a:tc>
-              </a:tr>
-              <a:tr h="364680">
-                <a:tc>
-                  <a:txBody>
-                    <a:bodyPr lIns="36000" rIns="36000" anchor="t">
-                      <a:noAutofit/>
-                    </a:bodyPr>
-                    <a:p>
-                      <a:pPr>
-                        <a:lnSpc>
-                          <a:spcPct val="100000"/>
-                        </a:lnSpc>
-                      </a:pPr>
-                      <a:r>
-                        <a:rPr b="0" lang="es-ES" sz="1800" spc="-1" strike="noStrike">
-                          <a:solidFill>
-                            <a:srgbClr val="000000"/>
-                          </a:solidFill>
-                          <a:latin typeface="Arial"/>
-                          <a:ea typeface="Noto Sans CJK SC"/>
-                        </a:rPr>
-                        <a:t>n(λg)</a:t>
-                      </a:r>
-                      <a:endParaRPr b="0" lang="es-ES" sz="1800" spc="-1" strike="noStrike">
-                        <a:solidFill>
-                          <a:srgbClr val="000000"/>
-                        </a:solidFill>
-                        <a:latin typeface="Arial"/>
-                      </a:endParaRPr>
-                    </a:p>
-                  </a:txBody>
-                  <a:tcPr anchor="t" marL="36000" marR="36000">
-                    <a:lnL w="7200">
-                      <a:solidFill>
-                        <a:srgbClr val="000000"/>
-                      </a:solidFill>
-                      <a:prstDash val="solid"/>
-                    </a:lnL>
-                    <a:lnR w="7200">
-                      <a:solidFill>
-                        <a:srgbClr val="000000"/>
-                      </a:solidFill>
-                      <a:prstDash val="solid"/>
-                    </a:lnR>
-                    <a:lnT w="7200">
-                      <a:solidFill>
-                        <a:srgbClr val="000000"/>
-                      </a:solidFill>
-                      <a:prstDash val="solid"/>
-                    </a:lnT>
-                    <a:lnB w="7200">
-                      <a:solidFill>
-                        <a:srgbClr val="000000"/>
-                      </a:solidFill>
-                      <a:prstDash val="solid"/>
-                    </a:lnB>
-                    <a:noFill/>
-                  </a:tcPr>
-                </a:tc>
-                <a:tc>
-                  <a:txBody>
-                    <a:bodyPr lIns="36000" rIns="36000" anchor="t">
-                      <a:noAutofit/>
-                    </a:bodyPr>
-                    <a:p>
-                      <a:pPr>
-                        <a:lnSpc>
-                          <a:spcPct val="100000"/>
-                        </a:lnSpc>
-                      </a:pPr>
-                      <a:r>
-                        <a:rPr b="0" lang="es-ES" sz="1800" spc="-1" strike="noStrike">
-                          <a:solidFill>
-                            <a:srgbClr val="000000"/>
-                          </a:solidFill>
-                          <a:latin typeface="Arial"/>
-                        </a:rPr>
-                        <a:t>1.915762</a:t>
-                      </a:r>
-                      <a:endParaRPr b="0" lang="es-ES" sz="1800" spc="-1" strike="noStrike">
-                        <a:solidFill>
-                          <a:srgbClr val="000000"/>
-                        </a:solidFill>
-                        <a:latin typeface="Arial"/>
-                      </a:endParaRPr>
-                    </a:p>
-                  </a:txBody>
-                  <a:tcPr anchor="t" marL="36000" marR="36000">
-                    <a:lnL w="7200">
-                      <a:solidFill>
-                        <a:srgbClr val="000000"/>
-                      </a:solidFill>
-                      <a:prstDash val="solid"/>
-                    </a:lnL>
-                    <a:lnR w="7200">
-                      <a:solidFill>
-                        <a:srgbClr val="000000"/>
-                      </a:solidFill>
-                      <a:prstDash val="solid"/>
-                    </a:lnR>
-                    <a:lnT w="7200">
-                      <a:solidFill>
-                        <a:srgbClr val="000000"/>
-                      </a:solidFill>
-                      <a:prstDash val="solid"/>
-                    </a:lnT>
-                    <a:lnB w="7200">
-                      <a:solidFill>
-                        <a:srgbClr val="000000"/>
-                      </a:solidFill>
-                      <a:prstDash val="solid"/>
-                    </a:lnB>
-                    <a:noFill/>
-                  </a:tcPr>
-                </a:tc>
-                <a:tc>
-                  <a:txBody>
-                    <a:bodyPr lIns="36000" rIns="36000" anchor="t">
-                      <a:noAutofit/>
-                    </a:bodyPr>
-                    <a:p>
-                      <a:pPr>
-                        <a:lnSpc>
-                          <a:spcPct val="100000"/>
-                        </a:lnSpc>
-                      </a:pPr>
-                      <a:r>
-                        <a:rPr b="0" lang="es-ES" sz="1800" spc="-1" strike="noStrike">
-                          <a:solidFill>
-                            <a:srgbClr val="000000"/>
-                          </a:solidFill>
-                          <a:latin typeface="Arial"/>
-                        </a:rPr>
-                        <a:t>1.915762</a:t>
-                      </a:r>
-                      <a:endParaRPr b="0" lang="es-ES" sz="1800" spc="-1" strike="noStrike">
-                        <a:solidFill>
-                          <a:srgbClr val="000000"/>
-                        </a:solidFill>
-                        <a:latin typeface="Arial"/>
-                      </a:endParaRPr>
-                    </a:p>
-                  </a:txBody>
-                  <a:tcPr anchor="t" marL="36000" marR="36000">
-                    <a:lnL w="7200">
-                      <a:solidFill>
-                        <a:srgbClr val="000000"/>
-                      </a:solidFill>
-                      <a:prstDash val="solid"/>
-                    </a:lnL>
-                    <a:lnR w="7200">
-                      <a:solidFill>
-                        <a:srgbClr val="000000"/>
-                      </a:solidFill>
-                      <a:prstDash val="solid"/>
-                    </a:lnR>
-                    <a:lnT w="7200">
-                      <a:solidFill>
-                        <a:srgbClr val="000000"/>
-                      </a:solidFill>
-                      <a:prstDash val="solid"/>
-                    </a:lnT>
-                    <a:lnB w="7200">
-                      <a:solidFill>
-                        <a:srgbClr val="000000"/>
-                      </a:solidFill>
-                      <a:prstDash val="solid"/>
-                    </a:lnB>
-                    <a:noFill/>
-                  </a:tcPr>
-                </a:tc>
-              </a:tr>
-              <a:tr h="364680">
-                <a:tc>
-                  <a:txBody>
-                    <a:bodyPr lIns="36000" rIns="36000" anchor="t">
-                      <a:noAutofit/>
-                    </a:bodyPr>
-                    <a:p>
-                      <a:pPr>
-                        <a:lnSpc>
-                          <a:spcPct val="100000"/>
-                        </a:lnSpc>
-                      </a:pPr>
-                      <a:r>
-                        <a:rPr b="0" lang="es-ES" sz="1800" spc="-1" strike="noStrike">
-                          <a:solidFill>
-                            <a:srgbClr val="000000"/>
-                          </a:solidFill>
-                          <a:latin typeface="Arial"/>
-                        </a:rPr>
-                        <a:t>D(s²/m)</a:t>
-                      </a:r>
-                      <a:endParaRPr b="0" lang="es-ES" sz="1800" spc="-1" strike="noStrike">
-                        <a:solidFill>
-                          <a:srgbClr val="000000"/>
-                        </a:solidFill>
-                        <a:latin typeface="Arial"/>
-                      </a:endParaRPr>
-                    </a:p>
-                  </a:txBody>
-                  <a:tcPr anchor="t" marL="36000" marR="36000">
-                    <a:lnL w="7200">
-                      <a:solidFill>
-                        <a:srgbClr val="000000"/>
-                      </a:solidFill>
-                      <a:prstDash val="solid"/>
-                    </a:lnL>
-                    <a:lnR w="7200">
-                      <a:solidFill>
-                        <a:srgbClr val="000000"/>
-                      </a:solidFill>
-                      <a:prstDash val="solid"/>
-                    </a:lnR>
-                    <a:lnT w="7200">
-                      <a:solidFill>
-                        <a:srgbClr val="000000"/>
-                      </a:solidFill>
-                      <a:prstDash val="solid"/>
-                    </a:lnT>
-                    <a:lnB w="7200">
-                      <a:solidFill>
-                        <a:srgbClr val="000000"/>
-                      </a:solidFill>
-                      <a:prstDash val="solid"/>
-                    </a:lnB>
-                    <a:noFill/>
-                  </a:tcPr>
-                </a:tc>
-                <a:tc>
-                  <a:txBody>
-                    <a:bodyPr lIns="36000" rIns="36000" anchor="t">
-                      <a:noAutofit/>
-                    </a:bodyPr>
-                    <a:p>
-                      <a:pPr>
-                        <a:lnSpc>
-                          <a:spcPct val="100000"/>
-                        </a:lnSpc>
-                      </a:pPr>
-                      <a:r>
-                        <a:rPr b="0" lang="es-ES" sz="1800" spc="-1" strike="noStrike">
-                          <a:solidFill>
-                            <a:srgbClr val="000000"/>
-                          </a:solidFill>
-                          <a:latin typeface="Arial"/>
-                        </a:rPr>
-                        <a:t>-9.895e-10</a:t>
-                      </a:r>
-                      <a:endParaRPr b="0" lang="es-ES" sz="1800" spc="-1" strike="noStrike">
-                        <a:solidFill>
-                          <a:srgbClr val="000000"/>
-                        </a:solidFill>
-                        <a:latin typeface="Arial"/>
-                      </a:endParaRPr>
-                    </a:p>
-                  </a:txBody>
-                  <a:tcPr anchor="t" marL="36000" marR="36000">
-                    <a:lnL w="7200">
-                      <a:solidFill>
-                        <a:srgbClr val="000000"/>
-                      </a:solidFill>
-                      <a:prstDash val="solid"/>
-                    </a:lnL>
-                    <a:lnR w="7200">
-                      <a:solidFill>
-                        <a:srgbClr val="000000"/>
-                      </a:solidFill>
-                      <a:prstDash val="solid"/>
-                    </a:lnR>
-                    <a:lnT w="7200">
-                      <a:solidFill>
-                        <a:srgbClr val="000000"/>
-                      </a:solidFill>
-                      <a:prstDash val="solid"/>
-                    </a:lnT>
-                    <a:lnB w="7200">
-                      <a:solidFill>
-                        <a:srgbClr val="000000"/>
-                      </a:solidFill>
-                      <a:prstDash val="solid"/>
-                    </a:lnB>
-                    <a:noFill/>
-                  </a:tcPr>
-                </a:tc>
-                <a:tc>
-                  <a:txBody>
-                    <a:bodyPr lIns="36000" rIns="36000" anchor="t">
-                      <a:noAutofit/>
-                    </a:bodyPr>
-                    <a:p>
-                      <a:pPr>
-                        <a:lnSpc>
-                          <a:spcPct val="100000"/>
-                        </a:lnSpc>
-                      </a:pPr>
-                      <a:r>
-                        <a:rPr b="0" lang="es-ES" sz="1800" spc="-1" strike="noStrike">
-                          <a:solidFill>
-                            <a:srgbClr val="000000"/>
-                          </a:solidFill>
-                          <a:latin typeface="Arial"/>
-                        </a:rPr>
-                        <a:t>-9.895e-10</a:t>
-                      </a:r>
-                      <a:endParaRPr b="0" lang="es-ES" sz="1800" spc="-1" strike="noStrike">
-                        <a:solidFill>
-                          <a:srgbClr val="000000"/>
-                        </a:solidFill>
-                        <a:latin typeface="Arial"/>
-                      </a:endParaRPr>
-                    </a:p>
-                  </a:txBody>
-                  <a:tcPr anchor="t" marL="36000" marR="36000">
-                    <a:lnL w="7200">
-                      <a:solidFill>
-                        <a:srgbClr val="000000"/>
-                      </a:solidFill>
-                      <a:prstDash val="solid"/>
-                    </a:lnL>
-                    <a:lnR w="7200">
-                      <a:solidFill>
-                        <a:srgbClr val="000000"/>
-                      </a:solidFill>
-                      <a:prstDash val="solid"/>
-                    </a:lnR>
-                    <a:lnT w="7200">
-                      <a:solidFill>
-                        <a:srgbClr val="000000"/>
-                      </a:solidFill>
-                      <a:prstDash val="solid"/>
-                    </a:lnT>
-                    <a:lnB w="7200">
-                      <a:solidFill>
-                        <a:srgbClr val="000000"/>
-                      </a:solidFill>
-                      <a:prstDash val="solid"/>
-                    </a:lnB>
-                    <a:noFill/>
-                  </a:tcPr>
-                </a:tc>
-              </a:tr>
-            </a:tbl>
-          </a:graphicData>
-        </a:graphic>
-      </p:graphicFrame>
-      <p:sp>
-        <p:nvSpPr>
-          <p:cNvPr id="107" name=""/>
           <p:cNvSpPr/>
           <p:nvPr/>
         </p:nvSpPr>
@@ -10470,24 +9766,162 @@
                 <a:spcPct val="100000"/>
               </a:lnSpc>
             </a:pPr>
-            <a:r>
-              <a:rPr b="0" lang="es-ES" sz="1800" spc="-1" strike="noStrike">
+            <a:endParaRPr b="0" lang="es-ES" sz="1800" spc="-1" strike="noStrike">
+              <a:solidFill>
+                <a:srgbClr val="000000"/>
+              </a:solidFill>
+              <a:latin typeface="Arial"/>
+            </a:endParaRPr>
+          </a:p>
+        </p:txBody>
+      </p:sp>
+      <p:sp>
+        <p:nvSpPr>
+          <p:cNvPr id="107" name=""/>
+          <p:cNvSpPr txBox="1"/>
+          <p:nvPr/>
+        </p:nvSpPr>
+        <p:spPr>
+          <a:xfrm>
+            <a:off x="720000" y="4860360"/>
+            <a:ext cx="11087280" cy="2050200"/>
+          </a:xfrm>
+          <a:prstGeom prst="rect">
+            <a:avLst/>
+          </a:prstGeom>
+          <a:noFill/>
+          <a:ln w="0">
+            <a:noFill/>
+          </a:ln>
+        </p:spPr>
+        <p:txBody>
+          <a:bodyPr lIns="90000" rIns="90000" tIns="45000" bIns="45000" anchor="t">
+            <a:noAutofit/>
+          </a:bodyPr>
+          <a:p>
+            <a:r>
+              <a:rPr b="0" lang="es-ES" sz="1000" spc="-1" strike="noStrike">
                 <a:solidFill>
                   <a:srgbClr val="000000"/>
                 </a:solidFill>
                 <a:latin typeface="Arial"/>
               </a:rPr>
-              <a:t>No entiendo muy bien qué hay que justificar aquí</a:t>
-            </a:r>
-            <a:endParaRPr b="0" lang="es-ES" sz="1800" spc="-1" strike="noStrike">
-              <a:solidFill>
-                <a:srgbClr val="000000"/>
-              </a:solidFill>
-              <a:latin typeface="Arial"/>
-            </a:endParaRPr>
-          </a:p>
-        </p:txBody>
-      </p:sp>
+              <a:t>Polynomial Coefficients:n1 represents the baseline effective refractive index, neff(lambda0), n2 represents the slope of the curve, n3 represents the second derivative, the curvature.</a:t>
+            </a:r>
+            <a:endParaRPr b="0" lang="es-ES" sz="1000" spc="-1" strike="noStrike">
+              <a:solidFill>
+                <a:srgbClr val="000000"/>
+              </a:solidFill>
+              <a:latin typeface="Arial"/>
+            </a:endParaRPr>
+          </a:p>
+          <a:p>
+            <a:r>
+              <a:rPr b="0" lang="es-ES" sz="1000" spc="-1" strike="noStrike">
+                <a:solidFill>
+                  <a:srgbClr val="000000"/>
+                </a:solidFill>
+                <a:latin typeface="Arial"/>
+              </a:rPr>
+              <a:t>Deep comparisson:The TE0 mode travels "slower" through the material, exhibiting both a higher effective index (1.605 compared to 1.527) and a higher group index (1.940 compared to 1.772). TM0 is more disperssive, 1.59e-09 s²/m compared to 1.07e-09s²/m for TE0, because the neff is smaller for TM.</a:t>
+            </a:r>
+            <a:endParaRPr b="0" lang="es-ES" sz="1000" spc="-1" strike="noStrike">
+              <a:solidFill>
+                <a:srgbClr val="000000"/>
+              </a:solidFill>
+              <a:latin typeface="Arial"/>
+            </a:endParaRPr>
+          </a:p>
+          <a:p>
+            <a:r>
+              <a:rPr b="0" lang="es-ES" sz="1000" spc="-1" strike="noStrike">
+                <a:solidFill>
+                  <a:srgbClr val="000000"/>
+                </a:solidFill>
+                <a:latin typeface="Arial"/>
+              </a:rPr>
+              <a:t>Shallow Comparisson:  Similar as the comments of deep comparisson, but with a significative difference of the disperssion(~4e-10 less) because of the slab introduced.</a:t>
+            </a:r>
+            <a:endParaRPr b="0" lang="es-ES" sz="1000" spc="-1" strike="noStrike">
+              <a:solidFill>
+                <a:srgbClr val="000000"/>
+              </a:solidFill>
+              <a:latin typeface="Arial"/>
+            </a:endParaRPr>
+          </a:p>
+          <a:p>
+            <a:r>
+              <a:rPr b="0" lang="es-ES" sz="1000" spc="-1" strike="noStrike">
+                <a:solidFill>
+                  <a:srgbClr val="000000"/>
+                </a:solidFill>
+                <a:latin typeface="Arial"/>
+              </a:rPr>
+              <a:t>Every D obtained are negative which means anomalous dispersion in the range of transmission. </a:t>
+            </a:r>
+            <a:endParaRPr b="0" lang="es-ES" sz="1000" spc="-1" strike="noStrike">
+              <a:solidFill>
+                <a:srgbClr val="000000"/>
+              </a:solidFill>
+              <a:latin typeface="Arial"/>
+            </a:endParaRPr>
+          </a:p>
+          <a:p>
+            <a:endParaRPr b="0" lang="es-ES" sz="1000" spc="-1" strike="noStrike">
+              <a:solidFill>
+                <a:srgbClr val="000000"/>
+              </a:solidFill>
+              <a:latin typeface="Arial"/>
+            </a:endParaRPr>
+          </a:p>
+        </p:txBody>
+      </p:sp>
+      <p:pic>
+        <p:nvPicPr>
+          <p:cNvPr id="108" name="" descr=""/>
+          <p:cNvPicPr/>
+          <p:nvPr/>
+        </p:nvPicPr>
+        <p:blipFill>
+          <a:blip r:embed="rId3"/>
+          <a:stretch/>
+        </p:blipFill>
+        <p:spPr>
+          <a:xfrm>
+            <a:off x="900000" y="1581840"/>
+            <a:ext cx="4500000" cy="3098160"/>
+          </a:xfrm>
+          <a:prstGeom prst="rect">
+            <a:avLst/>
+          </a:prstGeom>
+          <a:ln w="0">
+            <a:noFill/>
+          </a:ln>
+        </p:spPr>
+      </p:pic>
+      <p:pic>
+        <p:nvPicPr>
+          <p:cNvPr id="109" name="" descr=""/>
+          <p:cNvPicPr/>
+          <p:nvPr/>
+        </p:nvPicPr>
+        <p:blipFill>
+          <a:blip r:embed="rId4"/>
+          <a:stretch/>
+        </p:blipFill>
+        <p:spPr>
+          <a:xfrm>
+            <a:off x="6660000" y="1447920"/>
+            <a:ext cx="4101480" cy="3223080"/>
+          </a:xfrm>
+          <a:prstGeom prst="rect">
+            <a:avLst/>
+          </a:prstGeom>
+          <a:ln w="0">
+            <a:noFill/>
+          </a:ln>
+        </p:spPr>
+      </p:pic>
       <p:sp>
         <p:nvSpPr>
           <p:cNvPr id="4" name="PlaceHolder 3"/>
@@ -10502,7 +9936,7 @@
         <p:txBody>
           <a:bodyPr/>
           <a:p>
-            <a:fld id="{D583A6BB-6CFF-418E-A595-09FBFE5C42E8}" type="slidenum">
+            <a:fld id="{99FEB831-8A3F-423B-8872-589F3EDA1C34}" type="slidenum">
               <a:t>6</a:t>
             </a:fld>
           </a:p>
@@ -10540,7 +9974,7 @@
       </p:grpSpPr>
       <p:sp>
         <p:nvSpPr>
-          <p:cNvPr id="108" name="PlaceHolder 1"/>
+          <p:cNvPr id="110" name="PlaceHolder 1"/>
           <p:cNvSpPr>
             <a:spLocks noGrp="1"/>
           </p:cNvSpPr>
@@ -10615,7 +10049,7 @@
       </p:sp>
       <p:pic>
         <p:nvPicPr>
-          <p:cNvPr id="109" name="Gráfico 82" descr=""/>
+          <p:cNvPr id="111" name="Gráfico 82" descr=""/>
           <p:cNvPicPr/>
           <p:nvPr/>
         </p:nvPicPr>
@@ -10644,7 +10078,7 @@
       </p:pic>
       <p:sp>
         <p:nvSpPr>
-          <p:cNvPr id="110" name="PlaceHolder 2"/>
+          <p:cNvPr id="112" name="PlaceHolder 2"/>
           <p:cNvSpPr>
             <a:spLocks noGrp="1"/>
           </p:cNvSpPr>
@@ -10722,14 +10156,14 @@
       </p:sp>
       <p:sp>
         <p:nvSpPr>
-          <p:cNvPr id="111" name="CuadroTexto 1"/>
+          <p:cNvPr id="113" name="CuadroTexto 1"/>
           <p:cNvSpPr/>
           <p:nvPr/>
         </p:nvSpPr>
         <p:spPr>
           <a:xfrm>
             <a:off x="609480" y="4860360"/>
-            <a:ext cx="11199240" cy="1186920"/>
+            <a:ext cx="11199240" cy="1369800"/>
           </a:xfrm>
           <a:prstGeom prst="rect">
             <a:avLst/>
@@ -10769,7 +10203,7 @@
                 </a:solidFill>
                 <a:latin typeface="Arial"/>
               </a:rPr>
-              <a:t>Comment results, which is the safe radius?, consider safe means less than 0.1 dB/90º.</a:t>
+              <a:t>Safe Radius: R&gt;=50, because in that point total loss became less than 0.1dB/90º.</a:t>
             </a:r>
             <a:endParaRPr b="0" lang="es-ES" sz="1200" spc="-1" strike="noStrike">
               <a:solidFill>
@@ -10784,6 +10218,15 @@
                 <a:spcPct val="100000"/>
               </a:lnSpc>
             </a:pPr>
+            <a:r>
+              <a:rPr b="0" lang="en-US" sz="1200" spc="-1" strike="noStrike">
+                <a:solidFill>
+                  <a:schemeClr val="dk1"/>
+                </a:solidFill>
+                <a:latin typeface="Arial"/>
+              </a:rPr>
+              <a:t>Bend effective index became smaller as we make radius bigger because of the shift movement that produces the shape of the curve.</a:t>
+            </a:r>
             <a:endParaRPr b="0" lang="es-ES" sz="1200" spc="-1" strike="noStrike">
               <a:solidFill>
                 <a:srgbClr val="000000"/>
@@ -10843,11 +10286,33 @@
               <a:latin typeface="Arial"/>
             </a:endParaRPr>
           </a:p>
-        </p:txBody>
-      </p:sp>
-      <p:sp>
-        <p:nvSpPr>
-          <p:cNvPr id="112" name="Rectángulo 6"/>
+          <a:p>
+            <a:pPr algn="just" defTabSz="914400">
+              <a:lnSpc>
+                <a:spcPct val="100000"/>
+              </a:lnSpc>
+            </a:pPr>
+            <a:r>
+              <a:rPr b="0" lang="es-ES" sz="1200" spc="-1" strike="noStrike">
+                <a:solidFill>
+                  <a:srgbClr val="000000"/>
+                </a:solidFill>
+                <a:latin typeface="Arial"/>
+              </a:rPr>
+              <a:t>s</a:t>
+            </a:r>
+            <a:endParaRPr b="0" lang="es-ES" sz="1200" spc="-1" strike="noStrike">
+              <a:solidFill>
+                <a:srgbClr val="000000"/>
+              </a:solidFill>
+              <a:latin typeface="Arial"/>
+            </a:endParaRPr>
+          </a:p>
+        </p:txBody>
+      </p:sp>
+      <p:sp>
+        <p:nvSpPr>
+          <p:cNvPr id="114" name="Rectángulo 6"/>
           <p:cNvSpPr/>
           <p:nvPr/>
         </p:nvSpPr>
@@ -10902,7 +10367,7 @@
       </p:sp>
       <p:sp>
         <p:nvSpPr>
-          <p:cNvPr id="113" name="CuadroTexto 7"/>
+          <p:cNvPr id="115" name="CuadroTexto 7"/>
           <p:cNvSpPr/>
           <p:nvPr/>
         </p:nvSpPr>
@@ -10997,6 +10462,52 @@
           </a:p>
         </p:txBody>
       </p:sp>
+      <p:pic>
+        <p:nvPicPr>
+          <p:cNvPr id="116" name="" descr=""/>
+          <p:cNvPicPr/>
+          <p:nvPr/>
+        </p:nvPicPr>
+        <p:blipFill>
+          <a:blip r:embed="rId3"/>
+          <a:stretch/>
+        </p:blipFill>
+        <p:spPr>
+          <a:xfrm>
+            <a:off x="6120000" y="1468440"/>
+            <a:ext cx="5400000" cy="3211560"/>
+          </a:xfrm>
+          <a:prstGeom prst="rect">
+            <a:avLst/>
+          </a:prstGeom>
+          <a:ln w="0">
+            <a:noFill/>
+          </a:ln>
+        </p:spPr>
+      </p:pic>
+      <p:pic>
+        <p:nvPicPr>
+          <p:cNvPr id="117" name="" descr=""/>
+          <p:cNvPicPr/>
+          <p:nvPr/>
+        </p:nvPicPr>
+        <p:blipFill>
+          <a:blip r:embed="rId4"/>
+          <a:stretch/>
+        </p:blipFill>
+        <p:spPr>
+          <a:xfrm>
+            <a:off x="1440000" y="1497960"/>
+            <a:ext cx="4680000" cy="3225600"/>
+          </a:xfrm>
+          <a:prstGeom prst="rect">
+            <a:avLst/>
+          </a:prstGeom>
+          <a:ln w="0">
+            <a:noFill/>
+          </a:ln>
+        </p:spPr>
+      </p:pic>
       <p:sp>
         <p:nvSpPr>
           <p:cNvPr id="4" name="PlaceHolder 3"/>
@@ -11011,7 +10522,7 @@
         <p:txBody>
           <a:bodyPr/>
           <a:p>
-            <a:fld id="{4E3C2E29-CD6E-4140-AF24-9C2DA6DC0171}" type="slidenum">
+            <a:fld id="{DBCA3F30-06A2-4DD7-ABDF-A4376B7BAF81}" type="slidenum">
               <a:t>7</a:t>
             </a:fld>
           </a:p>
@@ -11049,7 +10560,7 @@
       </p:grpSpPr>
       <p:sp>
         <p:nvSpPr>
-          <p:cNvPr id="114" name="object 3"/>
+          <p:cNvPr id="118" name="object 3"/>
           <p:cNvSpPr/>
           <p:nvPr/>
         </p:nvSpPr>
@@ -11097,7 +10608,7 @@
       </p:sp>
       <p:sp>
         <p:nvSpPr>
-          <p:cNvPr id="115" name="PlaceHolder 1"/>
+          <p:cNvPr id="119" name="PlaceHolder 1"/>
           <p:cNvSpPr>
             <a:spLocks noGrp="1"/>
           </p:cNvSpPr>
@@ -11185,7 +10696,7 @@
         <p:txBody>
           <a:bodyPr/>
           <a:p>
-            <a:fld id="{625AB435-C27B-40EE-BE6A-AF012FCE72A8}" type="slidenum">
+            <a:fld id="{9FC05CB5-E32B-4C45-B140-FD0BCD32E9EC}" type="slidenum">
               <a:t>8</a:t>
             </a:fld>
           </a:p>

</xml_diff>